<commit_message>
hotfix: Minor fixes to the final slides decks
</commit_message>
<xml_diff>
--- a/source/beyond/farewell/_static/farewell.pptx
+++ b/source/beyond/farewell/_static/farewell.pptx
@@ -5,7 +5,7 @@
     <p:sldMasterId id="2147483648" r:id="rId1"/>
   </p:sldMasterIdLst>
   <p:notesMasterIdLst>
-    <p:notesMasterId r:id="rId28"/>
+    <p:notesMasterId r:id="rId29"/>
   </p:notesMasterIdLst>
   <p:sldIdLst>
     <p:sldId id="262" r:id="rId2"/>
@@ -33,7 +33,8 @@
     <p:sldId id="285" r:id="rId24"/>
     <p:sldId id="286" r:id="rId25"/>
     <p:sldId id="287" r:id="rId26"/>
-    <p:sldId id="261" r:id="rId27"/>
+    <p:sldId id="288" r:id="rId27"/>
+    <p:sldId id="261" r:id="rId28"/>
   </p:sldIdLst>
   <p:sldSz cx="12192000" cy="6858000"/>
   <p:notesSz cx="6858000" cy="9144000"/>
@@ -2882,7 +2883,7 @@
           <a:p>
             <a:fld id="{84F29782-C61A-CD4C-9376-B0A272778357}" type="datetimeFigureOut">
               <a:rPr lang="en-NO" smtClean="0"/>
-              <a:t>14/11/2022</a:t>
+              <a:t>13/11/2023</a:t>
             </a:fld>
             <a:endParaRPr lang="en-NO"/>
           </a:p>
@@ -3467,7 +3468,7 @@
           <a:p>
             <a:fld id="{100BD9C9-7907-5743-B025-04A356EF685E}" type="slidenum">
               <a:rPr lang="en-NO" smtClean="0"/>
-              <a:t>26</a:t>
+              <a:t>27</a:t>
             </a:fld>
             <a:endParaRPr lang="en-NO"/>
           </a:p>
@@ -7309,17 +7310,17 @@
           <a:p>
             <a:r>
               <a:rPr lang="en-US" noProof="0" dirty="0"/>
-              <a:t>Week 13 / Lecture 3</a:t>
+              <a:t>Beyond RAM/ Lecture 3</a:t>
             </a:r>
           </a:p>
         </p:txBody>
       </p:sp>
       <p:sp>
         <p:nvSpPr>
-          <p:cNvPr id="8" name="TextBox 7">
-            <a:extLst>
-              <a:ext uri="{FF2B5EF4-FFF2-40B4-BE49-F238E27FC236}">
-                <a16:creationId xmlns:a16="http://schemas.microsoft.com/office/drawing/2014/main" id="{80AB3142-7A07-A108-01C0-BC946F8DF08A}"/>
+          <p:cNvPr id="9" name="TextBox 8">
+            <a:extLst>
+              <a:ext uri="{FF2B5EF4-FFF2-40B4-BE49-F238E27FC236}">
+                <a16:creationId xmlns:a16="http://schemas.microsoft.com/office/drawing/2014/main" id="{FAC097C7-3487-79EA-E336-69AF7EAE3506}"/>
               </a:ext>
             </a:extLst>
           </p:cNvPr>
@@ -7328,8 +7329,8 @@
         </p:nvSpPr>
         <p:spPr>
           <a:xfrm>
-            <a:off x="8095488" y="5712362"/>
-            <a:ext cx="3922869" cy="646331"/>
+            <a:off x="8425908" y="5620413"/>
+            <a:ext cx="3433953" cy="646331"/>
           </a:xfrm>
           <a:prstGeom prst="rect">
             <a:avLst/>
@@ -7351,7 +7352,7 @@
                 <a:effectLst/>
                 <a:latin typeface="Montserrat" pitchFamily="2" charset="77"/>
               </a:rPr>
-              <a:t>Go to </a:t>
+              <a:t>Ask anything on </a:t>
             </a:r>
             <a:r>
               <a:rPr lang="en-GB" b="1" i="0" dirty="0" err="1">
@@ -7361,42 +7362,35 @@
                 <a:effectLst/>
                 <a:latin typeface="Montserrat" pitchFamily="2" charset="77"/>
               </a:rPr>
-              <a:t>www.menti.com</a:t>
-            </a:r>
-            <a:r>
-              <a:rPr lang="en-GB" b="0" i="0" dirty="0">
+              <a:t>menti.com</a:t>
+            </a:r>
+            <a:br>
+              <a:rPr lang="en-GB" b="1" dirty="0">
                 <a:solidFill>
                   <a:schemeClr val="accent6"/>
                 </a:solidFill>
-                <a:effectLst/>
                 <a:latin typeface="Montserrat" pitchFamily="2" charset="77"/>
               </a:rPr>
-              <a:t> and use </a:t>
-            </a:r>
-          </a:p>
-          <a:p>
-            <a:pPr algn="r"/>
-            <a:r>
-              <a:rPr lang="en-GB" b="0" i="0" dirty="0">
+            </a:br>
+            <a:r>
+              <a:rPr lang="en-GB" dirty="0">
                 <a:solidFill>
                   <a:schemeClr val="accent6"/>
                 </a:solidFill>
-                <a:effectLst/>
                 <a:latin typeface="Montserrat" pitchFamily="2" charset="77"/>
               </a:rPr>
-              <a:t>the code </a:t>
-            </a:r>
-            <a:r>
-              <a:rPr lang="en-GB" b="1" i="0" dirty="0">
+              <a:t>with code </a:t>
+            </a:r>
+            <a:r>
+              <a:rPr lang="en-GB" b="1" dirty="0">
                 <a:solidFill>
                   <a:schemeClr val="accent6"/>
                 </a:solidFill>
-                <a:effectLst/>
                 <a:latin typeface="Montserrat" pitchFamily="2" charset="77"/>
               </a:rPr>
-              <a:t>4482 2802</a:t>
-            </a:r>
-            <a:endParaRPr lang="en-NO" dirty="0">
+              <a:t>2855-5096</a:t>
+            </a:r>
+            <a:endParaRPr lang="en-NO" b="1" dirty="0">
               <a:solidFill>
                 <a:schemeClr val="accent6"/>
               </a:solidFill>
@@ -27376,6 +27370,270 @@
 </file>
 
 <file path=ppt/slides/slide26.xml><?xml version="1.0" encoding="utf-8"?>
+<p:sld xmlns:a="http://schemas.openxmlformats.org/drawingml/2006/main" xmlns:r="http://schemas.openxmlformats.org/officeDocument/2006/relationships" xmlns:p="http://schemas.openxmlformats.org/presentationml/2006/main">
+  <p:cSld>
+    <p:spTree>
+      <p:nvGrpSpPr>
+        <p:cNvPr id="1" name=""/>
+        <p:cNvGrpSpPr/>
+        <p:nvPr/>
+      </p:nvGrpSpPr>
+      <p:grpSpPr>
+        <a:xfrm>
+          <a:off x="0" y="0"/>
+          <a:ext cx="0" cy="0"/>
+          <a:chOff x="0" y="0"/>
+          <a:chExt cx="0" cy="0"/>
+        </a:xfrm>
+      </p:grpSpPr>
+      <p:sp>
+        <p:nvSpPr>
+          <p:cNvPr id="2" name="Title 1">
+            <a:extLst>
+              <a:ext uri="{FF2B5EF4-FFF2-40B4-BE49-F238E27FC236}">
+                <a16:creationId xmlns:a16="http://schemas.microsoft.com/office/drawing/2014/main" id="{DBF53F83-D0A3-009E-F892-8EA21E1608ED}"/>
+              </a:ext>
+            </a:extLst>
+          </p:cNvPr>
+          <p:cNvSpPr>
+            <a:spLocks noGrp="1"/>
+          </p:cNvSpPr>
+          <p:nvPr>
+            <p:ph type="title"/>
+          </p:nvPr>
+        </p:nvSpPr>
+        <p:spPr/>
+        <p:txBody>
+          <a:bodyPr/>
+          <a:lstStyle/>
+          <a:p>
+            <a:r>
+              <a:rPr lang="en-NO" dirty="0"/>
+              <a:t>Teaching Assistants?</a:t>
+            </a:r>
+          </a:p>
+        </p:txBody>
+      </p:sp>
+      <p:sp>
+        <p:nvSpPr>
+          <p:cNvPr id="6" name="Text Placeholder 5">
+            <a:extLst>
+              <a:ext uri="{FF2B5EF4-FFF2-40B4-BE49-F238E27FC236}">
+                <a16:creationId xmlns:a16="http://schemas.microsoft.com/office/drawing/2014/main" id="{31B30D99-7DC6-9F30-33AA-B11566580317}"/>
+              </a:ext>
+            </a:extLst>
+          </p:cNvPr>
+          <p:cNvSpPr>
+            <a:spLocks noGrp="1"/>
+          </p:cNvSpPr>
+          <p:nvPr>
+            <p:ph type="body" idx="1"/>
+          </p:nvPr>
+        </p:nvSpPr>
+        <p:spPr/>
+        <p:txBody>
+          <a:bodyPr/>
+          <a:lstStyle/>
+          <a:p>
+            <a:r>
+              <a:rPr lang="en-NO" dirty="0"/>
+              <a:t>Why?</a:t>
+            </a:r>
+          </a:p>
+        </p:txBody>
+      </p:sp>
+      <p:sp>
+        <p:nvSpPr>
+          <p:cNvPr id="7" name="Content Placeholder 6">
+            <a:extLst>
+              <a:ext uri="{FF2B5EF4-FFF2-40B4-BE49-F238E27FC236}">
+                <a16:creationId xmlns:a16="http://schemas.microsoft.com/office/drawing/2014/main" id="{5919FC37-1879-4A60-65F1-4B0F6B7F0428}"/>
+              </a:ext>
+            </a:extLst>
+          </p:cNvPr>
+          <p:cNvSpPr>
+            <a:spLocks noGrp="1"/>
+          </p:cNvSpPr>
+          <p:nvPr>
+            <p:ph sz="half" idx="2"/>
+          </p:nvPr>
+        </p:nvSpPr>
+        <p:spPr/>
+        <p:txBody>
+          <a:bodyPr/>
+          <a:lstStyle/>
+          <a:p>
+            <a:r>
+              <a:rPr lang="en-NO" dirty="0"/>
+              <a:t>Get paid </a:t>
+            </a:r>
+          </a:p>
+          <a:p>
+            <a:r>
+              <a:rPr lang="en-NO" dirty="0"/>
+              <a:t>Help your peers</a:t>
+            </a:r>
+          </a:p>
+          <a:p>
+            <a:r>
+              <a:rPr lang="en-NO" dirty="0"/>
+              <a:t>Get new experience</a:t>
+            </a:r>
+          </a:p>
+          <a:p>
+            <a:r>
+              <a:rPr lang="en-NO" dirty="0"/>
+              <a:t>Communication &amp; Leadership skills</a:t>
+            </a:r>
+          </a:p>
+          <a:p>
+            <a:endParaRPr lang="en-NO" dirty="0"/>
+          </a:p>
+        </p:txBody>
+      </p:sp>
+      <p:sp>
+        <p:nvSpPr>
+          <p:cNvPr id="8" name="Text Placeholder 7">
+            <a:extLst>
+              <a:ext uri="{FF2B5EF4-FFF2-40B4-BE49-F238E27FC236}">
+                <a16:creationId xmlns:a16="http://schemas.microsoft.com/office/drawing/2014/main" id="{3B44E435-4A83-EE4A-E479-B101FAAAEB1A}"/>
+              </a:ext>
+            </a:extLst>
+          </p:cNvPr>
+          <p:cNvSpPr>
+            <a:spLocks noGrp="1"/>
+          </p:cNvSpPr>
+          <p:nvPr>
+            <p:ph type="body" sz="quarter" idx="3"/>
+          </p:nvPr>
+        </p:nvSpPr>
+        <p:spPr/>
+        <p:txBody>
+          <a:bodyPr/>
+          <a:lstStyle/>
+          <a:p>
+            <a:r>
+              <a:rPr lang="en-NO" dirty="0"/>
+              <a:t>W</a:t>
+            </a:r>
+            <a:r>
+              <a:rPr lang="en-GB" dirty="0"/>
+              <a:t>ha</a:t>
+            </a:r>
+            <a:r>
+              <a:rPr lang="en-NO" dirty="0"/>
+              <a:t>t?</a:t>
+            </a:r>
+          </a:p>
+        </p:txBody>
+      </p:sp>
+      <p:sp>
+        <p:nvSpPr>
+          <p:cNvPr id="9" name="Content Placeholder 8">
+            <a:extLst>
+              <a:ext uri="{FF2B5EF4-FFF2-40B4-BE49-F238E27FC236}">
+                <a16:creationId xmlns:a16="http://schemas.microsoft.com/office/drawing/2014/main" id="{0BC0EBED-FA69-6E13-4091-E4149CAA72F3}"/>
+              </a:ext>
+            </a:extLst>
+          </p:cNvPr>
+          <p:cNvSpPr>
+            <a:spLocks noGrp="1"/>
+          </p:cNvSpPr>
+          <p:nvPr>
+            <p:ph sz="quarter" idx="4"/>
+          </p:nvPr>
+        </p:nvSpPr>
+        <p:spPr/>
+        <p:txBody>
+          <a:bodyPr/>
+          <a:lstStyle/>
+          <a:p>
+            <a:r>
+              <a:rPr lang="en-NO" dirty="0"/>
+              <a:t>Make the course less boring</a:t>
+            </a:r>
+          </a:p>
+          <a:p>
+            <a:r>
+              <a:rPr lang="en-NO" dirty="0"/>
+              <a:t>Grade lab sessions</a:t>
+            </a:r>
+          </a:p>
+          <a:p>
+            <a:r>
+              <a:rPr lang="en-NO" dirty="0"/>
+              <a:t>Help during lab sessions</a:t>
+            </a:r>
+          </a:p>
+          <a:p>
+            <a:r>
+              <a:rPr lang="en-NO" dirty="0"/>
+              <a:t>Propose new lectures/lab sessions</a:t>
+            </a:r>
+          </a:p>
+          <a:p>
+            <a:r>
+              <a:rPr lang="en-NO" dirty="0"/>
+              <a:t>Review/Write lecture notes</a:t>
+            </a:r>
+          </a:p>
+          <a:p>
+            <a:r>
+              <a:rPr lang="en-NO" dirty="0"/>
+              <a:t>Make Kahoot quizzes</a:t>
+            </a:r>
+          </a:p>
+          <a:p>
+            <a:r>
+              <a:rPr lang="en-NO" dirty="0"/>
+              <a:t>Ideas are welcome</a:t>
+            </a:r>
+          </a:p>
+        </p:txBody>
+      </p:sp>
+      <p:sp>
+        <p:nvSpPr>
+          <p:cNvPr id="5" name="Slide Number Placeholder 4">
+            <a:extLst>
+              <a:ext uri="{FF2B5EF4-FFF2-40B4-BE49-F238E27FC236}">
+                <a16:creationId xmlns:a16="http://schemas.microsoft.com/office/drawing/2014/main" id="{02DA002C-9038-2741-CF6B-2874B8565A94}"/>
+              </a:ext>
+            </a:extLst>
+          </p:cNvPr>
+          <p:cNvSpPr>
+            <a:spLocks noGrp="1"/>
+          </p:cNvSpPr>
+          <p:nvPr>
+            <p:ph type="sldNum" sz="quarter" idx="12"/>
+          </p:nvPr>
+        </p:nvSpPr>
+        <p:spPr/>
+        <p:txBody>
+          <a:bodyPr/>
+          <a:lstStyle/>
+          <a:p>
+            <a:fld id="{9EAE67CF-1745-2945-BC67-7BD79F205591}" type="slidenum">
+              <a:rPr lang="en-NO" smtClean="0"/>
+              <a:t>26</a:t>
+            </a:fld>
+            <a:endParaRPr lang="en-NO"/>
+          </a:p>
+        </p:txBody>
+      </p:sp>
+    </p:spTree>
+    <p:extLst>
+      <p:ext uri="{BB962C8B-B14F-4D97-AF65-F5344CB8AC3E}">
+        <p14:creationId xmlns:p14="http://schemas.microsoft.com/office/powerpoint/2010/main" val="1714300373"/>
+      </p:ext>
+    </p:extLst>
+  </p:cSld>
+  <p:clrMapOvr>
+    <a:masterClrMapping/>
+  </p:clrMapOvr>
+</p:sld>
+</file>
+
+<file path=ppt/slides/slide27.xml><?xml version="1.0" encoding="utf-8"?>
 <p:sld xmlns:a="http://schemas.openxmlformats.org/drawingml/2006/main" xmlns:r="http://schemas.openxmlformats.org/officeDocument/2006/relationships" xmlns:p="http://schemas.openxmlformats.org/presentationml/2006/main">
   <p:cSld>
     <p:spTree>

</xml_diff>